<commit_message>
Revise title slides for lectures 3,4
</commit_message>
<xml_diff>
--- a/ex/352-S22/staging/352-S22/lectures/04-app-dns-http.pptx
+++ b/ex/352-S22/staging/352-S22/lectures/04-app-dns-http.pptx
@@ -234,7 +234,7 @@
           <a:p>
             <a:fld id="{973C490B-630B-7F46-B6FE-05D0FD1689A8}" type="datetimeFigureOut">
               <a:rPr lang="en-US" smtClean="0"/>
-              <a:t>1/26/22</a:t>
+              <a:t>1/29/22</a:t>
             </a:fld>
             <a:endParaRPr lang="en-US"/>
           </a:p>
@@ -648,7 +648,7 @@
           <a:p>
             <a:fld id="{DEDCE603-2B12-5844-BEA7-E98E825B38C7}" type="datetimeFigureOut">
               <a:rPr lang="en-US" smtClean="0"/>
-              <a:t>1/26/22</a:t>
+              <a:t>1/29/22</a:t>
             </a:fld>
             <a:endParaRPr lang="en-US"/>
           </a:p>
@@ -846,7 +846,7 @@
           <a:p>
             <a:fld id="{DEDCE603-2B12-5844-BEA7-E98E825B38C7}" type="datetimeFigureOut">
               <a:rPr lang="en-US" smtClean="0"/>
-              <a:t>1/26/22</a:t>
+              <a:t>1/29/22</a:t>
             </a:fld>
             <a:endParaRPr lang="en-US"/>
           </a:p>
@@ -1054,7 +1054,7 @@
           <a:p>
             <a:fld id="{DEDCE603-2B12-5844-BEA7-E98E825B38C7}" type="datetimeFigureOut">
               <a:rPr lang="en-US" smtClean="0"/>
-              <a:t>1/26/22</a:t>
+              <a:t>1/29/22</a:t>
             </a:fld>
             <a:endParaRPr lang="en-US"/>
           </a:p>
@@ -1263,7 +1263,7 @@
           <a:p>
             <a:fld id="{DEDCE603-2B12-5844-BEA7-E98E825B38C7}" type="datetimeFigureOut">
               <a:rPr lang="en-US" smtClean="0"/>
-              <a:t>1/26/22</a:t>
+              <a:t>1/29/22</a:t>
             </a:fld>
             <a:endParaRPr lang="en-US"/>
           </a:p>
@@ -1538,7 +1538,7 @@
           <a:p>
             <a:fld id="{DEDCE603-2B12-5844-BEA7-E98E825B38C7}" type="datetimeFigureOut">
               <a:rPr lang="en-US" smtClean="0"/>
-              <a:t>1/26/22</a:t>
+              <a:t>1/29/22</a:t>
             </a:fld>
             <a:endParaRPr lang="en-US"/>
           </a:p>
@@ -1803,7 +1803,7 @@
           <a:p>
             <a:fld id="{DEDCE603-2B12-5844-BEA7-E98E825B38C7}" type="datetimeFigureOut">
               <a:rPr lang="en-US" smtClean="0"/>
-              <a:t>1/26/22</a:t>
+              <a:t>1/29/22</a:t>
             </a:fld>
             <a:endParaRPr lang="en-US"/>
           </a:p>
@@ -2215,7 +2215,7 @@
           <a:p>
             <a:fld id="{DEDCE603-2B12-5844-BEA7-E98E825B38C7}" type="datetimeFigureOut">
               <a:rPr lang="en-US" smtClean="0"/>
-              <a:t>1/26/22</a:t>
+              <a:t>1/29/22</a:t>
             </a:fld>
             <a:endParaRPr lang="en-US"/>
           </a:p>
@@ -2356,7 +2356,7 @@
           <a:p>
             <a:fld id="{DEDCE603-2B12-5844-BEA7-E98E825B38C7}" type="datetimeFigureOut">
               <a:rPr lang="en-US" smtClean="0"/>
-              <a:t>1/26/22</a:t>
+              <a:t>1/29/22</a:t>
             </a:fld>
             <a:endParaRPr lang="en-US"/>
           </a:p>
@@ -2469,7 +2469,7 @@
           <a:p>
             <a:fld id="{DEDCE603-2B12-5844-BEA7-E98E825B38C7}" type="datetimeFigureOut">
               <a:rPr lang="en-US" smtClean="0"/>
-              <a:t>1/26/22</a:t>
+              <a:t>1/29/22</a:t>
             </a:fld>
             <a:endParaRPr lang="en-US"/>
           </a:p>
@@ -2780,7 +2780,7 @@
           <a:p>
             <a:fld id="{DEDCE603-2B12-5844-BEA7-E98E825B38C7}" type="datetimeFigureOut">
               <a:rPr lang="en-US" smtClean="0"/>
-              <a:t>1/26/22</a:t>
+              <a:t>1/29/22</a:t>
             </a:fld>
             <a:endParaRPr lang="en-US"/>
           </a:p>
@@ -3068,7 +3068,7 @@
           <a:p>
             <a:fld id="{DEDCE603-2B12-5844-BEA7-E98E825B38C7}" type="datetimeFigureOut">
               <a:rPr lang="en-US" smtClean="0"/>
-              <a:t>1/26/22</a:t>
+              <a:t>1/29/22</a:t>
             </a:fld>
             <a:endParaRPr lang="en-US"/>
           </a:p>
@@ -3309,7 +3309,7 @@
           <a:p>
             <a:fld id="{DEDCE603-2B12-5844-BEA7-E98E825B38C7}" type="datetimeFigureOut">
               <a:rPr lang="en-US" smtClean="0"/>
-              <a:t>1/26/22</a:t>
+              <a:t>1/29/22</a:t>
             </a:fld>
             <a:endParaRPr lang="en-US"/>
           </a:p>
@@ -3824,42 +3824,34 @@
               <a:defRPr/>
             </a:pPr>
             <a:r>
-              <a:rPr lang="en-US" sz="2800" dirty="0">
+              <a:rPr lang="en-US" sz="3200" dirty="0">
                 <a:ea typeface="ＭＳ Ｐゴシック" charset="0"/>
               </a:rPr>
-              <a:t>CS 352, Lecture 4</a:t>
+              <a:t>Lecture 4</a:t>
             </a:r>
             <a:br>
-              <a:rPr lang="en-US" sz="2800" dirty="0">
+              <a:rPr lang="en-US" sz="3200" dirty="0">
                 <a:ea typeface="ＭＳ Ｐゴシック" charset="0"/>
               </a:rPr>
             </a:br>
             <a:r>
-              <a:rPr lang="en-US" sz="2800" dirty="0">
+              <a:rPr lang="en-US" sz="3200" dirty="0">
                 <a:ea typeface="ＭＳ Ｐゴシック" charset="0"/>
                 <a:hlinkClick r:id="rId2"/>
               </a:rPr>
               <a:t>http://www.cs.rutgers.edu/~sn624/352-S22</a:t>
             </a:r>
-            <a:endParaRPr lang="en-US" sz="2800" dirty="0">
+            <a:endParaRPr lang="en-US" sz="3200" dirty="0">
               <a:ea typeface="ＭＳ Ｐゴシック" charset="0"/>
+              <a:cs typeface="+mn-cs"/>
             </a:endParaRPr>
           </a:p>
           <a:p>
             <a:pPr>
               <a:defRPr/>
             </a:pPr>
-            <a:endParaRPr lang="en-US" sz="2800" dirty="0">
-              <a:ea typeface="ＭＳ Ｐゴシック" charset="0"/>
-              <a:cs typeface="+mn-cs"/>
-            </a:endParaRPr>
-          </a:p>
-          <a:p>
-            <a:pPr>
-              <a:defRPr/>
-            </a:pPr>
-            <a:r>
-              <a:rPr lang="en-US" sz="2800" dirty="0">
+            <a:r>
+              <a:rPr lang="en-US" sz="3200" dirty="0">
                 <a:ea typeface="ＭＳ Ｐゴシック" charset="0"/>
                 <a:cs typeface="+mn-cs"/>
               </a:rPr>
@@ -9871,7 +9863,7 @@
           <a:graphicData uri="http://schemas.openxmlformats.org/presentationml/2006/ole">
             <mc:AlternateContent xmlns:mc="http://schemas.openxmlformats.org/markup-compatibility/2006">
               <mc:Choice xmlns:v="urn:schemas-microsoft-com:vml" Requires="v">
-                <p:oleObj spid="_x0000_s123783" name="Clip" r:id="rId3" imgW="17462500" imgH="14478000" progId="MS_ClipArt_Gallery.2">
+                <p:oleObj spid="_x0000_s123787" name="Clip" r:id="rId3" imgW="17462500" imgH="14478000" progId="MS_ClipArt_Gallery.2">
                   <p:embed/>
                 </p:oleObj>
               </mc:Choice>
@@ -10171,7 +10163,7 @@
           <a:graphicData uri="http://schemas.openxmlformats.org/presentationml/2006/ole">
             <mc:AlternateContent xmlns:mc="http://schemas.openxmlformats.org/markup-compatibility/2006">
               <mc:Choice xmlns:v="urn:schemas-microsoft-com:vml" Requires="v">
-                <p:oleObj spid="_x0000_s123784" name="Clip" r:id="rId5" imgW="17462500" imgH="14478000" progId="MS_ClipArt_Gallery.2">
+                <p:oleObj spid="_x0000_s123788" name="Clip" r:id="rId5" imgW="17462500" imgH="14478000" progId="MS_ClipArt_Gallery.2">
                   <p:embed/>
                 </p:oleObj>
               </mc:Choice>
@@ -16471,7 +16463,7 @@
           <a:graphicData uri="http://schemas.openxmlformats.org/presentationml/2006/ole">
             <mc:AlternateContent xmlns:mc="http://schemas.openxmlformats.org/markup-compatibility/2006">
               <mc:Choice xmlns:v="urn:schemas-microsoft-com:vml" Requires="v">
-                <p:oleObj spid="_x0000_s92100" name="Clip" r:id="rId3" imgW="17462500" imgH="14478000" progId="MS_ClipArt_Gallery.2">
+                <p:oleObj spid="_x0000_s92102" name="Clip" r:id="rId3" imgW="17462500" imgH="14478000" progId="MS_ClipArt_Gallery.2">
                   <p:embed/>
                 </p:oleObj>
               </mc:Choice>

</xml_diff>